<commit_message>
Submit transportation prediction project
</commit_message>
<xml_diff>
--- a/TransportationProject/Presentation.pptx
+++ b/TransportationProject/Presentation.pptx
@@ -204,7 +204,7 @@
           <a:p>
             <a:fld id="{9C00AD37-C02B-4B7C-9DEE-2183DA719EC8}" type="datetimeFigureOut">
               <a:rPr lang="zh-CN" altLang="en-US" smtClean="0"/>
-              <a:t>2024/12/8</a:t>
+              <a:t>2024/12/9</a:t>
             </a:fld>
             <a:endParaRPr lang="zh-CN" altLang="en-US"/>
           </a:p>
@@ -705,7 +705,7 @@
           <a:p>
             <a:fld id="{978A2CB2-CF20-45AE-AF43-5466C2D5F1D2}" type="datetimeFigureOut">
               <a:rPr lang="zh-CN" altLang="en-US" smtClean="0"/>
-              <a:t>2024/12/8</a:t>
+              <a:t>2024/12/9</a:t>
             </a:fld>
             <a:endParaRPr lang="zh-CN" altLang="en-US"/>
           </a:p>
@@ -905,7 +905,7 @@
           <a:p>
             <a:fld id="{978A2CB2-CF20-45AE-AF43-5466C2D5F1D2}" type="datetimeFigureOut">
               <a:rPr lang="zh-CN" altLang="en-US" smtClean="0"/>
-              <a:t>2024/12/8</a:t>
+              <a:t>2024/12/9</a:t>
             </a:fld>
             <a:endParaRPr lang="zh-CN" altLang="en-US"/>
           </a:p>
@@ -1115,7 +1115,7 @@
           <a:p>
             <a:fld id="{978A2CB2-CF20-45AE-AF43-5466C2D5F1D2}" type="datetimeFigureOut">
               <a:rPr lang="zh-CN" altLang="en-US" smtClean="0"/>
-              <a:t>2024/12/8</a:t>
+              <a:t>2024/12/9</a:t>
             </a:fld>
             <a:endParaRPr lang="zh-CN" altLang="en-US"/>
           </a:p>
@@ -1315,7 +1315,7 @@
           <a:p>
             <a:fld id="{978A2CB2-CF20-45AE-AF43-5466C2D5F1D2}" type="datetimeFigureOut">
               <a:rPr lang="zh-CN" altLang="en-US" smtClean="0"/>
-              <a:t>2024/12/8</a:t>
+              <a:t>2024/12/9</a:t>
             </a:fld>
             <a:endParaRPr lang="zh-CN" altLang="en-US"/>
           </a:p>
@@ -1591,7 +1591,7 @@
           <a:p>
             <a:fld id="{978A2CB2-CF20-45AE-AF43-5466C2D5F1D2}" type="datetimeFigureOut">
               <a:rPr lang="zh-CN" altLang="en-US" smtClean="0"/>
-              <a:t>2024/12/8</a:t>
+              <a:t>2024/12/9</a:t>
             </a:fld>
             <a:endParaRPr lang="zh-CN" altLang="en-US"/>
           </a:p>
@@ -1859,7 +1859,7 @@
           <a:p>
             <a:fld id="{978A2CB2-CF20-45AE-AF43-5466C2D5F1D2}" type="datetimeFigureOut">
               <a:rPr lang="zh-CN" altLang="en-US" smtClean="0"/>
-              <a:t>2024/12/8</a:t>
+              <a:t>2024/12/9</a:t>
             </a:fld>
             <a:endParaRPr lang="zh-CN" altLang="en-US"/>
           </a:p>
@@ -2274,7 +2274,7 @@
           <a:p>
             <a:fld id="{978A2CB2-CF20-45AE-AF43-5466C2D5F1D2}" type="datetimeFigureOut">
               <a:rPr lang="zh-CN" altLang="en-US" smtClean="0"/>
-              <a:t>2024/12/8</a:t>
+              <a:t>2024/12/9</a:t>
             </a:fld>
             <a:endParaRPr lang="zh-CN" altLang="en-US"/>
           </a:p>
@@ -2416,7 +2416,7 @@
           <a:p>
             <a:fld id="{978A2CB2-CF20-45AE-AF43-5466C2D5F1D2}" type="datetimeFigureOut">
               <a:rPr lang="zh-CN" altLang="en-US" smtClean="0"/>
-              <a:t>2024/12/8</a:t>
+              <a:t>2024/12/9</a:t>
             </a:fld>
             <a:endParaRPr lang="zh-CN" altLang="en-US"/>
           </a:p>
@@ -2529,7 +2529,7 @@
           <a:p>
             <a:fld id="{978A2CB2-CF20-45AE-AF43-5466C2D5F1D2}" type="datetimeFigureOut">
               <a:rPr lang="zh-CN" altLang="en-US" smtClean="0"/>
-              <a:t>2024/12/8</a:t>
+              <a:t>2024/12/9</a:t>
             </a:fld>
             <a:endParaRPr lang="zh-CN" altLang="en-US"/>
           </a:p>
@@ -2842,7 +2842,7 @@
           <a:p>
             <a:fld id="{978A2CB2-CF20-45AE-AF43-5466C2D5F1D2}" type="datetimeFigureOut">
               <a:rPr lang="zh-CN" altLang="en-US" smtClean="0"/>
-              <a:t>2024/12/8</a:t>
+              <a:t>2024/12/9</a:t>
             </a:fld>
             <a:endParaRPr lang="zh-CN" altLang="en-US"/>
           </a:p>
@@ -3131,7 +3131,7 @@
           <a:p>
             <a:fld id="{978A2CB2-CF20-45AE-AF43-5466C2D5F1D2}" type="datetimeFigureOut">
               <a:rPr lang="zh-CN" altLang="en-US" smtClean="0"/>
-              <a:t>2024/12/8</a:t>
+              <a:t>2024/12/9</a:t>
             </a:fld>
             <a:endParaRPr lang="zh-CN" altLang="en-US"/>
           </a:p>
@@ -3374,7 +3374,7 @@
           <a:p>
             <a:fld id="{978A2CB2-CF20-45AE-AF43-5466C2D5F1D2}" type="datetimeFigureOut">
               <a:rPr lang="zh-CN" altLang="en-US" smtClean="0"/>
-              <a:t>2024/12/8</a:t>
+              <a:t>2024/12/9</a:t>
             </a:fld>
             <a:endParaRPr lang="zh-CN" altLang="en-US"/>
           </a:p>
@@ -6280,60 +6280,45 @@
           <a:chExt cx="0" cy="0"/>
         </a:xfrm>
       </p:grpSpPr>
-      <p:sp>
-        <p:nvSpPr>
-          <p:cNvPr id="2" name="Title 1">
-            <a:extLst>
-              <a:ext uri="{FF2B5EF4-FFF2-40B4-BE49-F238E27FC236}">
-                <a16:creationId xmlns:a16="http://schemas.microsoft.com/office/drawing/2014/main" id="{748EC8D1-0AC3-C587-2BDF-983C157F9EA7}"/>
-              </a:ext>
-            </a:extLst>
-          </p:cNvPr>
-          <p:cNvSpPr>
-            <a:spLocks noGrp="1"/>
-          </p:cNvSpPr>
-          <p:nvPr>
-            <p:ph type="title"/>
-          </p:nvPr>
-        </p:nvSpPr>
-        <p:spPr/>
-        <p:txBody>
-          <a:bodyPr/>
-          <a:lstStyle/>
-          <a:p>
-            <a:r>
-              <a:rPr lang="en-US" altLang="zh-CN" dirty="0"/>
-              <a:t>Thanks for Watching!</a:t>
-            </a:r>
-            <a:endParaRPr lang="zh-CN" altLang="en-US" dirty="0"/>
-          </a:p>
-        </p:txBody>
-      </p:sp>
-      <p:sp>
-        <p:nvSpPr>
-          <p:cNvPr id="3" name="Content Placeholder 2">
-            <a:extLst>
-              <a:ext uri="{FF2B5EF4-FFF2-40B4-BE49-F238E27FC236}">
-                <a16:creationId xmlns:a16="http://schemas.microsoft.com/office/drawing/2014/main" id="{8A6F6CB1-171C-CD5B-37CC-B69BB8CF510B}"/>
-              </a:ext>
-            </a:extLst>
-          </p:cNvPr>
-          <p:cNvSpPr>
-            <a:spLocks noGrp="1"/>
-          </p:cNvSpPr>
-          <p:nvPr>
-            <p:ph idx="1"/>
-          </p:nvPr>
-        </p:nvSpPr>
-        <p:spPr/>
-        <p:txBody>
-          <a:bodyPr/>
-          <a:lstStyle/>
-          <a:p>
-            <a:endParaRPr lang="zh-CN" altLang="en-US" dirty="0"/>
-          </a:p>
-        </p:txBody>
-      </p:sp>
+      <p:pic>
+        <p:nvPicPr>
+          <p:cNvPr id="6" name="Picture 5">
+            <a:extLst>
+              <a:ext uri="{FF2B5EF4-FFF2-40B4-BE49-F238E27FC236}">
+                <a16:creationId xmlns:a16="http://schemas.microsoft.com/office/drawing/2014/main" id="{32D01A63-03EA-8CA2-F1B7-94D993BFF191}"/>
+              </a:ext>
+            </a:extLst>
+          </p:cNvPr>
+          <p:cNvPicPr>
+            <a:picLocks noChangeAspect="1"/>
+          </p:cNvPicPr>
+          <p:nvPr/>
+        </p:nvPicPr>
+        <p:blipFill>
+          <a:blip r:embed="rId2">
+            <a:extLst>
+              <a:ext uri="{28A0092B-C50C-407E-A947-70E740481C1C}">
+                <a14:useLocalDpi xmlns:a14="http://schemas.microsoft.com/office/drawing/2010/main" val="0"/>
+              </a:ext>
+              <a:ext uri="{837473B0-CC2E-450A-ABE3-18F120FF3D39}">
+                <a1611:picAttrSrcUrl xmlns:a1611="http://schemas.microsoft.com/office/drawing/2016/11/main" r:id="rId3"/>
+              </a:ext>
+            </a:extLst>
+          </a:blip>
+          <a:stretch>
+            <a:fillRect/>
+          </a:stretch>
+        </p:blipFill>
+        <p:spPr>
+          <a:xfrm>
+            <a:off x="0" y="0"/>
+            <a:ext cx="12191999" cy="6858000"/>
+          </a:xfrm>
+          <a:prstGeom prst="rect">
+            <a:avLst/>
+          </a:prstGeom>
+        </p:spPr>
+      </p:pic>
     </p:spTree>
     <p:extLst>
       <p:ext uri="{BB962C8B-B14F-4D97-AF65-F5344CB8AC3E}">

</xml_diff>